<commit_message>
Removed extra image files. Reformatted and resized images in Chapter 2. Added Hamlyn paper content to Chapter 3.
</commit_message>
<xml_diff>
--- a/Images/Chapter2/RobotSetup/RobotSetup.pptx
+++ b/Images/Chapter2/RobotSetup/RobotSetup.pptx
@@ -108,6 +108,22 @@
       </a:defRPr>
     </a:lvl9pPr>
   </p:defaultTextStyle>
+  <p:extLst>
+    <p:ext uri="{EFAFB233-063F-42B5-8137-9DF3F51BA10A}">
+      <p15:sldGuideLst xmlns:p15="http://schemas.microsoft.com/office/powerpoint/2012/main">
+        <p15:guide id="1" orient="horz" pos="576">
+          <p15:clr>
+            <a:srgbClr val="A4A3A4"/>
+          </p15:clr>
+        </p15:guide>
+        <p15:guide id="2" pos="2190">
+          <p15:clr>
+            <a:srgbClr val="A4A3A4"/>
+          </p15:clr>
+        </p15:guide>
+      </p15:sldGuideLst>
+    </p:ext>
+  </p:extLst>
 </p:presentation>
 </file>
 
@@ -193,7 +209,7 @@
           <a:p>
             <a:fld id="{18ECEA4D-39BA-448F-860C-381BF736226A}" type="datetimeFigureOut">
               <a:rPr lang="en-US" smtClean="0"/>
-              <a:t>6/19/2014</a:t>
+              <a:t>9/23/2015</a:t>
             </a:fld>
             <a:endParaRPr lang="en-US"/>
           </a:p>
@@ -820,7 +836,7 @@
           <a:p>
             <a:fld id="{04CF43CF-16EB-4291-A0AC-C885296CEA92}" type="datetimeFigureOut">
               <a:rPr lang="en-US" smtClean="0"/>
-              <a:t>6/19/2014</a:t>
+              <a:t>9/23/2015</a:t>
             </a:fld>
             <a:endParaRPr lang="en-US"/>
           </a:p>
@@ -990,7 +1006,7 @@
           <a:p>
             <a:fld id="{04CF43CF-16EB-4291-A0AC-C885296CEA92}" type="datetimeFigureOut">
               <a:rPr lang="en-US" smtClean="0"/>
-              <a:t>6/19/2014</a:t>
+              <a:t>9/23/2015</a:t>
             </a:fld>
             <a:endParaRPr lang="en-US"/>
           </a:p>
@@ -1170,7 +1186,7 @@
           <a:p>
             <a:fld id="{04CF43CF-16EB-4291-A0AC-C885296CEA92}" type="datetimeFigureOut">
               <a:rPr lang="en-US" smtClean="0"/>
-              <a:t>6/19/2014</a:t>
+              <a:t>9/23/2015</a:t>
             </a:fld>
             <a:endParaRPr lang="en-US"/>
           </a:p>
@@ -1340,7 +1356,7 @@
           <a:p>
             <a:fld id="{04CF43CF-16EB-4291-A0AC-C885296CEA92}" type="datetimeFigureOut">
               <a:rPr lang="en-US" smtClean="0"/>
-              <a:t>6/19/2014</a:t>
+              <a:t>9/23/2015</a:t>
             </a:fld>
             <a:endParaRPr lang="en-US"/>
           </a:p>
@@ -1586,7 +1602,7 @@
           <a:p>
             <a:fld id="{04CF43CF-16EB-4291-A0AC-C885296CEA92}" type="datetimeFigureOut">
               <a:rPr lang="en-US" smtClean="0"/>
-              <a:t>6/19/2014</a:t>
+              <a:t>9/23/2015</a:t>
             </a:fld>
             <a:endParaRPr lang="en-US"/>
           </a:p>
@@ -1874,7 +1890,7 @@
           <a:p>
             <a:fld id="{04CF43CF-16EB-4291-A0AC-C885296CEA92}" type="datetimeFigureOut">
               <a:rPr lang="en-US" smtClean="0"/>
-              <a:t>6/19/2014</a:t>
+              <a:t>9/23/2015</a:t>
             </a:fld>
             <a:endParaRPr lang="en-US"/>
           </a:p>
@@ -2301,7 +2317,7 @@
           <a:p>
             <a:fld id="{04CF43CF-16EB-4291-A0AC-C885296CEA92}" type="datetimeFigureOut">
               <a:rPr lang="en-US" smtClean="0"/>
-              <a:t>6/19/2014</a:t>
+              <a:t>9/23/2015</a:t>
             </a:fld>
             <a:endParaRPr lang="en-US"/>
           </a:p>
@@ -2419,7 +2435,7 @@
           <a:p>
             <a:fld id="{04CF43CF-16EB-4291-A0AC-C885296CEA92}" type="datetimeFigureOut">
               <a:rPr lang="en-US" smtClean="0"/>
-              <a:t>6/19/2014</a:t>
+              <a:t>9/23/2015</a:t>
             </a:fld>
             <a:endParaRPr lang="en-US"/>
           </a:p>
@@ -2514,7 +2530,7 @@
           <a:p>
             <a:fld id="{04CF43CF-16EB-4291-A0AC-C885296CEA92}" type="datetimeFigureOut">
               <a:rPr lang="en-US" smtClean="0"/>
-              <a:t>6/19/2014</a:t>
+              <a:t>9/23/2015</a:t>
             </a:fld>
             <a:endParaRPr lang="en-US"/>
           </a:p>
@@ -2791,7 +2807,7 @@
           <a:p>
             <a:fld id="{04CF43CF-16EB-4291-A0AC-C885296CEA92}" type="datetimeFigureOut">
               <a:rPr lang="en-US" smtClean="0"/>
-              <a:t>6/19/2014</a:t>
+              <a:t>9/23/2015</a:t>
             </a:fld>
             <a:endParaRPr lang="en-US"/>
           </a:p>
@@ -3044,7 +3060,7 @@
           <a:p>
             <a:fld id="{04CF43CF-16EB-4291-A0AC-C885296CEA92}" type="datetimeFigureOut">
               <a:rPr lang="en-US" smtClean="0"/>
-              <a:t>6/19/2014</a:t>
+              <a:t>9/23/2015</a:t>
             </a:fld>
             <a:endParaRPr lang="en-US"/>
           </a:p>
@@ -3257,7 +3273,7 @@
           <a:p>
             <a:fld id="{04CF43CF-16EB-4291-A0AC-C885296CEA92}" type="datetimeFigureOut">
               <a:rPr lang="en-US" smtClean="0"/>
-              <a:t>6/19/2014</a:t>
+              <a:t>9/23/2015</a:t>
             </a:fld>
             <a:endParaRPr lang="en-US"/>
           </a:p>
@@ -6662,7 +6678,7 @@
           <a:lstStyle/>
           <a:p>
             <a:pPr algn="ctr"/>
-            <a:endParaRPr lang="en-US" sz="700">
+            <a:endParaRPr lang="en-US" sz="1000">
               <a:latin typeface="NimbusRomNo9L" panose="01010103010101010101" pitchFamily="2" charset="0"/>
             </a:endParaRPr>
           </a:p>
@@ -6711,7 +6727,7 @@
           <a:lstStyle/>
           <a:p>
             <a:pPr algn="ctr"/>
-            <a:endParaRPr lang="en-US" sz="700">
+            <a:endParaRPr lang="en-US" sz="1000">
               <a:latin typeface="NimbusRomNo9L" panose="01010103010101010101" pitchFamily="2" charset="0"/>
             </a:endParaRPr>
           </a:p>
@@ -6877,7 +6893,7 @@
           <a:lstStyle/>
           <a:p>
             <a:pPr algn="ctr"/>
-            <a:endParaRPr lang="en-US" sz="700">
+            <a:endParaRPr lang="en-US" sz="1000">
               <a:latin typeface="NimbusRomNo9L" panose="01010103010101010101" pitchFamily="2" charset="0"/>
             </a:endParaRPr>
           </a:p>
@@ -6930,8 +6946,8 @@
         </p:nvSpPr>
         <p:spPr>
           <a:xfrm flipH="1">
-            <a:off x="54657" y="61556"/>
-            <a:ext cx="562384" cy="295466"/>
+            <a:off x="54655" y="57486"/>
+            <a:ext cx="756085" cy="357021"/>
           </a:xfrm>
           <a:prstGeom prst="rect">
             <a:avLst/>
@@ -6948,305 +6964,29 @@
           <a:p>
             <a:pPr algn="ctr"/>
             <a:r>
-              <a:rPr lang="en-US" sz="900" dirty="0" smtClean="0">
+              <a:rPr lang="en-US" sz="1100" dirty="0" smtClean="0">
                 <a:latin typeface="NimbusRomNo9L" panose="01010103010101010101" pitchFamily="2" charset="0"/>
                 <a:cs typeface="Times New Roman" panose="02020603050405020304" pitchFamily="18" charset="0"/>
               </a:rPr>
               <a:t>ultrasound transducer</a:t>
             </a:r>
-            <a:endParaRPr lang="en-US" sz="900" dirty="0">
+            <a:endParaRPr lang="en-US" sz="1100" dirty="0">
               <a:latin typeface="NimbusRomNo9L" panose="01010103010101010101" pitchFamily="2" charset="0"/>
               <a:cs typeface="Times New Roman" panose="02020603050405020304" pitchFamily="18" charset="0"/>
             </a:endParaRPr>
           </a:p>
         </p:txBody>
       </p:sp>
-      <p:grpSp>
-        <p:nvGrpSpPr>
-          <p:cNvPr id="3" name="Group 2"/>
-          <p:cNvGrpSpPr/>
-          <p:nvPr/>
-        </p:nvGrpSpPr>
-        <p:grpSpPr>
-          <a:xfrm>
-            <a:off x="4009029" y="397150"/>
-            <a:ext cx="756084" cy="587895"/>
-            <a:chOff x="3948500" y="397150"/>
-            <a:chExt cx="756084" cy="587895"/>
-          </a:xfrm>
-        </p:grpSpPr>
-        <p:sp>
-          <p:nvSpPr>
-            <p:cNvPr id="164" name="TextBox 163"/>
-            <p:cNvSpPr txBox="1"/>
-            <p:nvPr/>
-          </p:nvSpPr>
-          <p:spPr>
-            <a:xfrm flipH="1">
-              <a:off x="3948500" y="397150"/>
-              <a:ext cx="756084" cy="156966"/>
-            </a:xfrm>
-            <a:prstGeom prst="rect">
-              <a:avLst/>
-            </a:prstGeom>
-            <a:solidFill>
-              <a:schemeClr val="bg1"/>
-            </a:solidFill>
-          </p:spPr>
-          <p:txBody>
-            <a:bodyPr wrap="square" lIns="0" tIns="0" rIns="0" bIns="18288" rtlCol="0">
-              <a:spAutoFit/>
-            </a:bodyPr>
-            <a:lstStyle/>
-            <a:p>
-              <a:pPr algn="ctr"/>
-              <a:r>
-                <a:rPr lang="en-US" sz="900" dirty="0" smtClean="0">
-                  <a:latin typeface="NimbusRomNo9L" panose="01010103010101010101" pitchFamily="2" charset="0"/>
-                  <a:cs typeface="Times New Roman" panose="02020603050405020304" pitchFamily="18" charset="0"/>
-                </a:rPr>
-                <a:t>rotation motor</a:t>
-              </a:r>
-              <a:endParaRPr lang="en-US" sz="900" dirty="0">
-                <a:latin typeface="NimbusRomNo9L" panose="01010103010101010101" pitchFamily="2" charset="0"/>
-                <a:cs typeface="Times New Roman" panose="02020603050405020304" pitchFamily="18" charset="0"/>
-              </a:endParaRPr>
-            </a:p>
-          </p:txBody>
-        </p:sp>
-        <p:cxnSp>
-          <p:nvCxnSpPr>
-            <p:cNvPr id="165" name="Straight Connector 164"/>
-            <p:cNvCxnSpPr/>
-            <p:nvPr/>
-          </p:nvCxnSpPr>
-          <p:spPr>
-            <a:xfrm>
-              <a:off x="4326542" y="518356"/>
-              <a:ext cx="0" cy="466689"/>
-            </a:xfrm>
-            <a:prstGeom prst="line">
-              <a:avLst/>
-            </a:prstGeom>
-            <a:noFill/>
-            <a:ln w="9525">
-              <a:solidFill>
-                <a:schemeClr val="bg1"/>
-              </a:solidFill>
-            </a:ln>
-          </p:spPr>
-          <p:style>
-            <a:lnRef idx="2">
-              <a:schemeClr val="accent1">
-                <a:shade val="50000"/>
-              </a:schemeClr>
-            </a:lnRef>
-            <a:fillRef idx="1">
-              <a:schemeClr val="accent1"/>
-            </a:fillRef>
-            <a:effectRef idx="0">
-              <a:schemeClr val="accent1"/>
-            </a:effectRef>
-            <a:fontRef idx="minor">
-              <a:schemeClr val="lt1"/>
-            </a:fontRef>
-          </p:style>
-        </p:cxnSp>
-      </p:grpSp>
-      <p:grpSp>
-        <p:nvGrpSpPr>
-          <p:cNvPr id="5" name="Group 4"/>
-          <p:cNvGrpSpPr/>
-          <p:nvPr/>
-        </p:nvGrpSpPr>
-        <p:grpSpPr>
-          <a:xfrm>
-            <a:off x="5743288" y="397150"/>
-            <a:ext cx="770115" cy="972420"/>
-            <a:chOff x="5743288" y="397150"/>
-            <a:chExt cx="770115" cy="972420"/>
-          </a:xfrm>
-        </p:grpSpPr>
-        <p:sp>
-          <p:nvSpPr>
-            <p:cNvPr id="167" name="TextBox 166"/>
-            <p:cNvSpPr txBox="1"/>
-            <p:nvPr/>
-          </p:nvSpPr>
-          <p:spPr>
-            <a:xfrm flipH="1">
-              <a:off x="5743288" y="397150"/>
-              <a:ext cx="770115" cy="156966"/>
-            </a:xfrm>
-            <a:prstGeom prst="rect">
-              <a:avLst/>
-            </a:prstGeom>
-            <a:solidFill>
-              <a:schemeClr val="bg1"/>
-            </a:solidFill>
-          </p:spPr>
-          <p:txBody>
-            <a:bodyPr wrap="square" lIns="0" tIns="0" rIns="0" bIns="18288" rtlCol="0">
-              <a:spAutoFit/>
-            </a:bodyPr>
-            <a:lstStyle/>
-            <a:p>
-              <a:pPr algn="ctr"/>
-              <a:r>
-                <a:rPr lang="en-US" sz="900" dirty="0" smtClean="0">
-                  <a:latin typeface="NimbusRomNo9L" panose="01010103010101010101" pitchFamily="2" charset="0"/>
-                  <a:cs typeface="Times New Roman" panose="02020603050405020304" pitchFamily="18" charset="0"/>
-                </a:rPr>
-                <a:t>insertion motor</a:t>
-              </a:r>
-              <a:endParaRPr lang="en-US" sz="900" dirty="0">
-                <a:latin typeface="NimbusRomNo9L" panose="01010103010101010101" pitchFamily="2" charset="0"/>
-                <a:cs typeface="Times New Roman" panose="02020603050405020304" pitchFamily="18" charset="0"/>
-              </a:endParaRPr>
-            </a:p>
-          </p:txBody>
-        </p:sp>
-        <p:cxnSp>
-          <p:nvCxnSpPr>
-            <p:cNvPr id="168" name="Straight Connector 167"/>
-            <p:cNvCxnSpPr/>
-            <p:nvPr/>
-          </p:nvCxnSpPr>
-          <p:spPr>
-            <a:xfrm>
-              <a:off x="6128345" y="554116"/>
-              <a:ext cx="0" cy="815454"/>
-            </a:xfrm>
-            <a:prstGeom prst="line">
-              <a:avLst/>
-            </a:prstGeom>
-            <a:noFill/>
-            <a:ln w="9525">
-              <a:solidFill>
-                <a:schemeClr val="bg1"/>
-              </a:solidFill>
-            </a:ln>
-          </p:spPr>
-          <p:style>
-            <a:lnRef idx="2">
-              <a:schemeClr val="accent1">
-                <a:shade val="50000"/>
-              </a:schemeClr>
-            </a:lnRef>
-            <a:fillRef idx="1">
-              <a:schemeClr val="accent1"/>
-            </a:fillRef>
-            <a:effectRef idx="0">
-              <a:schemeClr val="accent1"/>
-            </a:effectRef>
-            <a:fontRef idx="minor">
-              <a:schemeClr val="lt1"/>
-            </a:fontRef>
-          </p:style>
-        </p:cxnSp>
-      </p:grpSp>
-      <p:grpSp>
-        <p:nvGrpSpPr>
-          <p:cNvPr id="4" name="Group 3"/>
-          <p:cNvGrpSpPr/>
-          <p:nvPr/>
-        </p:nvGrpSpPr>
-        <p:grpSpPr>
-          <a:xfrm>
-            <a:off x="4939065" y="397150"/>
-            <a:ext cx="630270" cy="976850"/>
-            <a:chOff x="4908801" y="397150"/>
-            <a:chExt cx="630270" cy="976850"/>
-          </a:xfrm>
-        </p:grpSpPr>
-        <p:sp>
-          <p:nvSpPr>
-            <p:cNvPr id="169" name="TextBox 168"/>
-            <p:cNvSpPr txBox="1"/>
-            <p:nvPr/>
-          </p:nvSpPr>
-          <p:spPr>
-            <a:xfrm flipH="1">
-              <a:off x="4908801" y="397150"/>
-              <a:ext cx="630270" cy="156966"/>
-            </a:xfrm>
-            <a:prstGeom prst="rect">
-              <a:avLst/>
-            </a:prstGeom>
-            <a:solidFill>
-              <a:schemeClr val="bg1"/>
-            </a:solidFill>
-          </p:spPr>
-          <p:txBody>
-            <a:bodyPr wrap="square" lIns="0" tIns="0" rIns="0" bIns="18288" rtlCol="0">
-              <a:spAutoFit/>
-            </a:bodyPr>
-            <a:lstStyle/>
-            <a:p>
-              <a:pPr algn="ctr"/>
-              <a:r>
-                <a:rPr lang="en-US" sz="900" dirty="0" smtClean="0">
-                  <a:latin typeface="NimbusRomNo9L" panose="01010103010101010101" pitchFamily="2" charset="0"/>
-                  <a:cs typeface="Times New Roman" panose="02020603050405020304" pitchFamily="18" charset="0"/>
-                </a:rPr>
-                <a:t>linear slide</a:t>
-              </a:r>
-              <a:endParaRPr lang="en-US" sz="900" dirty="0">
-                <a:latin typeface="NimbusRomNo9L" panose="01010103010101010101" pitchFamily="2" charset="0"/>
-                <a:cs typeface="Times New Roman" panose="02020603050405020304" pitchFamily="18" charset="0"/>
-              </a:endParaRPr>
-            </a:p>
-          </p:txBody>
-        </p:sp>
-        <p:cxnSp>
-          <p:nvCxnSpPr>
-            <p:cNvPr id="170" name="Straight Connector 169"/>
-            <p:cNvCxnSpPr/>
-            <p:nvPr/>
-          </p:nvCxnSpPr>
-          <p:spPr>
-            <a:xfrm flipH="1">
-              <a:off x="5223936" y="554116"/>
-              <a:ext cx="0" cy="819884"/>
-            </a:xfrm>
-            <a:prstGeom prst="line">
-              <a:avLst/>
-            </a:prstGeom>
-            <a:noFill/>
-            <a:ln w="9525">
-              <a:solidFill>
-                <a:schemeClr val="bg1"/>
-              </a:solidFill>
-            </a:ln>
-          </p:spPr>
-          <p:style>
-            <a:lnRef idx="2">
-              <a:schemeClr val="accent1">
-                <a:shade val="50000"/>
-              </a:schemeClr>
-            </a:lnRef>
-            <a:fillRef idx="1">
-              <a:schemeClr val="accent1"/>
-            </a:fillRef>
-            <a:effectRef idx="0">
-              <a:schemeClr val="accent1"/>
-            </a:effectRef>
-            <a:fontRef idx="minor">
-              <a:schemeClr val="lt1"/>
-            </a:fontRef>
-          </p:style>
-        </p:cxnSp>
-      </p:grpSp>
-      <p:sp>
-        <p:nvSpPr>
-          <p:cNvPr id="171" name="TextBox 170"/>
+      <p:sp>
+        <p:nvSpPr>
+          <p:cNvPr id="164" name="TextBox 163"/>
           <p:cNvSpPr txBox="1"/>
           <p:nvPr/>
         </p:nvSpPr>
         <p:spPr>
           <a:xfrm flipH="1">
-            <a:off x="1098773" y="397150"/>
-            <a:ext cx="900100" cy="156966"/>
+            <a:off x="4009029" y="194319"/>
+            <a:ext cx="756084" cy="357021"/>
           </a:xfrm>
           <a:prstGeom prst="rect">
             <a:avLst/>
@@ -7263,13 +7003,13 @@
           <a:p>
             <a:pPr algn="ctr"/>
             <a:r>
-              <a:rPr lang="en-US" sz="900" dirty="0" smtClean="0">
+              <a:rPr lang="en-US" sz="1100" dirty="0" smtClean="0">
                 <a:latin typeface="NimbusRomNo9L" panose="01010103010101010101" pitchFamily="2" charset="0"/>
                 <a:cs typeface="Times New Roman" panose="02020603050405020304" pitchFamily="18" charset="0"/>
               </a:rPr>
-              <a:t>vibration module</a:t>
+              <a:t>rotation motor</a:t>
             </a:r>
-            <a:endParaRPr lang="en-US" sz="900" dirty="0">
+            <a:endParaRPr lang="en-US" sz="1100" dirty="0">
               <a:latin typeface="NimbusRomNo9L" panose="01010103010101010101" pitchFamily="2" charset="0"/>
               <a:cs typeface="Times New Roman" panose="02020603050405020304" pitchFamily="18" charset="0"/>
             </a:endParaRPr>
@@ -7278,14 +7018,14 @@
       </p:sp>
       <p:cxnSp>
         <p:nvCxnSpPr>
-          <p:cNvPr id="172" name="Straight Connector 171"/>
+          <p:cNvPr id="165" name="Straight Connector 164"/>
           <p:cNvCxnSpPr/>
           <p:nvPr/>
         </p:nvCxnSpPr>
         <p:spPr>
           <a:xfrm>
-            <a:off x="1199567" y="520261"/>
-            <a:ext cx="0" cy="358135"/>
+            <a:off x="4387071" y="518356"/>
+            <a:ext cx="0" cy="466689"/>
           </a:xfrm>
           <a:prstGeom prst="line">
             <a:avLst/>
@@ -7314,108 +7054,16 @@
           </a:fontRef>
         </p:style>
       </p:cxnSp>
-      <p:grpSp>
-        <p:nvGrpSpPr>
-          <p:cNvPr id="2" name="Group 1"/>
-          <p:cNvGrpSpPr/>
-          <p:nvPr/>
-        </p:nvGrpSpPr>
-        <p:grpSpPr>
-          <a:xfrm>
-            <a:off x="2809747" y="397150"/>
-            <a:ext cx="1025330" cy="661266"/>
-            <a:chOff x="2809747" y="397150"/>
-            <a:chExt cx="1025330" cy="661266"/>
-          </a:xfrm>
-        </p:grpSpPr>
-        <p:sp>
-          <p:nvSpPr>
-            <p:cNvPr id="174" name="TextBox 173"/>
-            <p:cNvSpPr txBox="1"/>
-            <p:nvPr/>
-          </p:nvSpPr>
-          <p:spPr>
-            <a:xfrm flipH="1">
-              <a:off x="2809747" y="397150"/>
-              <a:ext cx="1025330" cy="156966"/>
-            </a:xfrm>
-            <a:prstGeom prst="rect">
-              <a:avLst/>
-            </a:prstGeom>
-            <a:solidFill>
-              <a:schemeClr val="bg1"/>
-            </a:solidFill>
-          </p:spPr>
-          <p:txBody>
-            <a:bodyPr wrap="square" lIns="0" tIns="0" rIns="0" bIns="18288" rtlCol="0">
-              <a:spAutoFit/>
-            </a:bodyPr>
-            <a:lstStyle/>
-            <a:p>
-              <a:pPr algn="ctr"/>
-              <a:r>
-                <a:rPr lang="en-US" sz="900" dirty="0" smtClean="0">
-                  <a:latin typeface="NimbusRomNo9L" panose="01010103010101010101" pitchFamily="2" charset="0"/>
-                  <a:cs typeface="Times New Roman" panose="02020603050405020304" pitchFamily="18" charset="0"/>
-                </a:rPr>
-                <a:t>anti-buckling sheath</a:t>
-              </a:r>
-              <a:endParaRPr lang="en-US" sz="900" dirty="0">
-                <a:latin typeface="NimbusRomNo9L" panose="01010103010101010101" pitchFamily="2" charset="0"/>
-                <a:cs typeface="Times New Roman" panose="02020603050405020304" pitchFamily="18" charset="0"/>
-              </a:endParaRPr>
-            </a:p>
-          </p:txBody>
-        </p:sp>
-        <p:cxnSp>
-          <p:nvCxnSpPr>
-            <p:cNvPr id="175" name="Straight Connector 174"/>
-            <p:cNvCxnSpPr/>
-            <p:nvPr/>
-          </p:nvCxnSpPr>
-          <p:spPr>
-            <a:xfrm>
-              <a:off x="3322412" y="554116"/>
-              <a:ext cx="0" cy="504300"/>
-            </a:xfrm>
-            <a:prstGeom prst="line">
-              <a:avLst/>
-            </a:prstGeom>
-            <a:noFill/>
-            <a:ln w="9525">
-              <a:solidFill>
-                <a:schemeClr val="bg1"/>
-              </a:solidFill>
-            </a:ln>
-          </p:spPr>
-          <p:style>
-            <a:lnRef idx="2">
-              <a:schemeClr val="accent1">
-                <a:shade val="50000"/>
-              </a:schemeClr>
-            </a:lnRef>
-            <a:fillRef idx="1">
-              <a:schemeClr val="accent1"/>
-            </a:fillRef>
-            <a:effectRef idx="0">
-              <a:schemeClr val="accent1"/>
-            </a:effectRef>
-            <a:fontRef idx="minor">
-              <a:schemeClr val="lt1"/>
-            </a:fontRef>
-          </p:style>
-        </p:cxnSp>
-      </p:grpSp>
-      <p:sp>
-        <p:nvSpPr>
-          <p:cNvPr id="176" name="TextBox 175"/>
+      <p:sp>
+        <p:nvSpPr>
+          <p:cNvPr id="167" name="TextBox 166"/>
           <p:cNvSpPr txBox="1"/>
           <p:nvPr/>
         </p:nvSpPr>
         <p:spPr>
           <a:xfrm flipH="1">
-            <a:off x="774737" y="61556"/>
-            <a:ext cx="828092" cy="156966"/>
+            <a:off x="5743288" y="194319"/>
+            <a:ext cx="770115" cy="357021"/>
           </a:xfrm>
           <a:prstGeom prst="rect">
             <a:avLst/>
@@ -7432,13 +7080,335 @@
           <a:p>
             <a:pPr algn="ctr"/>
             <a:r>
-              <a:rPr lang="en-US" sz="900" dirty="0" smtClean="0">
+              <a:rPr lang="en-US" sz="1100" dirty="0" smtClean="0">
+                <a:latin typeface="NimbusRomNo9L" panose="01010103010101010101" pitchFamily="2" charset="0"/>
+                <a:cs typeface="Times New Roman" panose="02020603050405020304" pitchFamily="18" charset="0"/>
+              </a:rPr>
+              <a:t>insertion motor</a:t>
+            </a:r>
+            <a:endParaRPr lang="en-US" sz="1100" dirty="0">
+              <a:latin typeface="NimbusRomNo9L" panose="01010103010101010101" pitchFamily="2" charset="0"/>
+              <a:cs typeface="Times New Roman" panose="02020603050405020304" pitchFamily="18" charset="0"/>
+            </a:endParaRPr>
+          </a:p>
+        </p:txBody>
+      </p:sp>
+      <p:cxnSp>
+        <p:nvCxnSpPr>
+          <p:cNvPr id="168" name="Straight Connector 167"/>
+          <p:cNvCxnSpPr/>
+          <p:nvPr/>
+        </p:nvCxnSpPr>
+        <p:spPr>
+          <a:xfrm>
+            <a:off x="6128345" y="554116"/>
+            <a:ext cx="0" cy="815454"/>
+          </a:xfrm>
+          <a:prstGeom prst="line">
+            <a:avLst/>
+          </a:prstGeom>
+          <a:noFill/>
+          <a:ln w="9525">
+            <a:solidFill>
+              <a:schemeClr val="bg1"/>
+            </a:solidFill>
+          </a:ln>
+        </p:spPr>
+        <p:style>
+          <a:lnRef idx="2">
+            <a:schemeClr val="accent1">
+              <a:shade val="50000"/>
+            </a:schemeClr>
+          </a:lnRef>
+          <a:fillRef idx="1">
+            <a:schemeClr val="accent1"/>
+          </a:fillRef>
+          <a:effectRef idx="0">
+            <a:schemeClr val="accent1"/>
+          </a:effectRef>
+          <a:fontRef idx="minor">
+            <a:schemeClr val="lt1"/>
+          </a:fontRef>
+        </p:style>
+      </p:cxnSp>
+      <p:sp>
+        <p:nvSpPr>
+          <p:cNvPr id="169" name="TextBox 168"/>
+          <p:cNvSpPr txBox="1"/>
+          <p:nvPr/>
+        </p:nvSpPr>
+        <p:spPr>
+          <a:xfrm flipH="1">
+            <a:off x="4939065" y="194319"/>
+            <a:ext cx="622570" cy="357021"/>
+          </a:xfrm>
+          <a:prstGeom prst="rect">
+            <a:avLst/>
+          </a:prstGeom>
+          <a:solidFill>
+            <a:schemeClr val="bg1"/>
+          </a:solidFill>
+        </p:spPr>
+        <p:txBody>
+          <a:bodyPr wrap="square" lIns="0" tIns="0" rIns="0" bIns="18288" rtlCol="0">
+            <a:spAutoFit/>
+          </a:bodyPr>
+          <a:lstStyle/>
+          <a:p>
+            <a:pPr algn="ctr"/>
+            <a:r>
+              <a:rPr lang="en-US" sz="1100" dirty="0" smtClean="0">
+                <a:latin typeface="NimbusRomNo9L" panose="01010103010101010101" pitchFamily="2" charset="0"/>
+                <a:cs typeface="Times New Roman" panose="02020603050405020304" pitchFamily="18" charset="0"/>
+              </a:rPr>
+              <a:t>linear </a:t>
+            </a:r>
+            <a:endParaRPr lang="en-US" sz="1100" dirty="0" smtClean="0">
+              <a:latin typeface="NimbusRomNo9L" panose="01010103010101010101" pitchFamily="2" charset="0"/>
+              <a:cs typeface="Times New Roman" panose="02020603050405020304" pitchFamily="18" charset="0"/>
+            </a:endParaRPr>
+          </a:p>
+          <a:p>
+            <a:pPr algn="ctr"/>
+            <a:r>
+              <a:rPr lang="en-US" sz="1100" dirty="0" smtClean="0">
+                <a:latin typeface="NimbusRomNo9L" panose="01010103010101010101" pitchFamily="2" charset="0"/>
+                <a:cs typeface="Times New Roman" panose="02020603050405020304" pitchFamily="18" charset="0"/>
+              </a:rPr>
+              <a:t>slide</a:t>
+            </a:r>
+            <a:endParaRPr lang="en-US" sz="1100" dirty="0">
+              <a:latin typeface="NimbusRomNo9L" panose="01010103010101010101" pitchFamily="2" charset="0"/>
+              <a:cs typeface="Times New Roman" panose="02020603050405020304" pitchFamily="18" charset="0"/>
+            </a:endParaRPr>
+          </a:p>
+        </p:txBody>
+      </p:sp>
+      <p:cxnSp>
+        <p:nvCxnSpPr>
+          <p:cNvPr id="170" name="Straight Connector 169"/>
+          <p:cNvCxnSpPr/>
+          <p:nvPr/>
+        </p:nvCxnSpPr>
+        <p:spPr>
+          <a:xfrm flipH="1">
+            <a:off x="5254200" y="554116"/>
+            <a:ext cx="0" cy="819884"/>
+          </a:xfrm>
+          <a:prstGeom prst="line">
+            <a:avLst/>
+          </a:prstGeom>
+          <a:noFill/>
+          <a:ln w="9525">
+            <a:solidFill>
+              <a:schemeClr val="bg1"/>
+            </a:solidFill>
+          </a:ln>
+        </p:spPr>
+        <p:style>
+          <a:lnRef idx="2">
+            <a:schemeClr val="accent1">
+              <a:shade val="50000"/>
+            </a:schemeClr>
+          </a:lnRef>
+          <a:fillRef idx="1">
+            <a:schemeClr val="accent1"/>
+          </a:fillRef>
+          <a:effectRef idx="0">
+            <a:schemeClr val="accent1"/>
+          </a:effectRef>
+          <a:fontRef idx="minor">
+            <a:schemeClr val="lt1"/>
+          </a:fontRef>
+        </p:style>
+      </p:cxnSp>
+      <p:sp>
+        <p:nvSpPr>
+          <p:cNvPr id="171" name="TextBox 170"/>
+          <p:cNvSpPr txBox="1"/>
+          <p:nvPr/>
+        </p:nvSpPr>
+        <p:spPr>
+          <a:xfrm flipH="1">
+            <a:off x="1170781" y="342617"/>
+            <a:ext cx="742893" cy="357021"/>
+          </a:xfrm>
+          <a:prstGeom prst="rect">
+            <a:avLst/>
+          </a:prstGeom>
+          <a:solidFill>
+            <a:schemeClr val="bg1"/>
+          </a:solidFill>
+        </p:spPr>
+        <p:txBody>
+          <a:bodyPr wrap="square" lIns="0" tIns="0" rIns="0" bIns="18288" rtlCol="0">
+            <a:spAutoFit/>
+          </a:bodyPr>
+          <a:lstStyle/>
+          <a:p>
+            <a:pPr algn="ctr"/>
+            <a:r>
+              <a:rPr lang="en-US" sz="1100" dirty="0" smtClean="0">
+                <a:latin typeface="NimbusRomNo9L" panose="01010103010101010101" pitchFamily="2" charset="0"/>
+                <a:cs typeface="Times New Roman" panose="02020603050405020304" pitchFamily="18" charset="0"/>
+              </a:rPr>
+              <a:t>vibration module</a:t>
+            </a:r>
+            <a:endParaRPr lang="en-US" sz="1100" dirty="0">
+              <a:latin typeface="NimbusRomNo9L" panose="01010103010101010101" pitchFamily="2" charset="0"/>
+              <a:cs typeface="Times New Roman" panose="02020603050405020304" pitchFamily="18" charset="0"/>
+            </a:endParaRPr>
+          </a:p>
+        </p:txBody>
+      </p:sp>
+      <p:cxnSp>
+        <p:nvCxnSpPr>
+          <p:cNvPr id="172" name="Straight Connector 171"/>
+          <p:cNvCxnSpPr/>
+          <p:nvPr/>
+        </p:nvCxnSpPr>
+        <p:spPr>
+          <a:xfrm>
+            <a:off x="1199567" y="520261"/>
+            <a:ext cx="0" cy="358135"/>
+          </a:xfrm>
+          <a:prstGeom prst="line">
+            <a:avLst/>
+          </a:prstGeom>
+          <a:noFill/>
+          <a:ln w="9525">
+            <a:solidFill>
+              <a:schemeClr val="bg1"/>
+            </a:solidFill>
+          </a:ln>
+        </p:spPr>
+        <p:style>
+          <a:lnRef idx="2">
+            <a:schemeClr val="accent1">
+              <a:shade val="50000"/>
+            </a:schemeClr>
+          </a:lnRef>
+          <a:fillRef idx="1">
+            <a:schemeClr val="accent1"/>
+          </a:fillRef>
+          <a:effectRef idx="0">
+            <a:schemeClr val="accent1"/>
+          </a:effectRef>
+          <a:fontRef idx="minor">
+            <a:schemeClr val="lt1"/>
+          </a:fontRef>
+        </p:style>
+      </p:cxnSp>
+      <p:sp>
+        <p:nvSpPr>
+          <p:cNvPr id="174" name="TextBox 173"/>
+          <p:cNvSpPr txBox="1"/>
+          <p:nvPr/>
+        </p:nvSpPr>
+        <p:spPr>
+          <a:xfrm flipH="1">
+            <a:off x="2829505" y="194319"/>
+            <a:ext cx="969568" cy="357021"/>
+          </a:xfrm>
+          <a:prstGeom prst="rect">
+            <a:avLst/>
+          </a:prstGeom>
+          <a:solidFill>
+            <a:schemeClr val="bg1"/>
+          </a:solidFill>
+        </p:spPr>
+        <p:txBody>
+          <a:bodyPr wrap="square" lIns="0" tIns="0" rIns="0" bIns="18288" rtlCol="0">
+            <a:spAutoFit/>
+          </a:bodyPr>
+          <a:lstStyle/>
+          <a:p>
+            <a:pPr algn="ctr"/>
+            <a:r>
+              <a:rPr lang="en-US" sz="1100" dirty="0" smtClean="0">
+                <a:latin typeface="NimbusRomNo9L" panose="01010103010101010101" pitchFamily="2" charset="0"/>
+                <a:cs typeface="Times New Roman" panose="02020603050405020304" pitchFamily="18" charset="0"/>
+              </a:rPr>
+              <a:t>anti-buckling sheath</a:t>
+            </a:r>
+            <a:endParaRPr lang="en-US" sz="1100" dirty="0">
+              <a:latin typeface="NimbusRomNo9L" panose="01010103010101010101" pitchFamily="2" charset="0"/>
+              <a:cs typeface="Times New Roman" panose="02020603050405020304" pitchFamily="18" charset="0"/>
+            </a:endParaRPr>
+          </a:p>
+        </p:txBody>
+      </p:sp>
+      <p:cxnSp>
+        <p:nvCxnSpPr>
+          <p:cNvPr id="175" name="Straight Connector 174"/>
+          <p:cNvCxnSpPr/>
+          <p:nvPr/>
+        </p:nvCxnSpPr>
+        <p:spPr>
+          <a:xfrm>
+            <a:off x="3322412" y="554116"/>
+            <a:ext cx="0" cy="504300"/>
+          </a:xfrm>
+          <a:prstGeom prst="line">
+            <a:avLst/>
+          </a:prstGeom>
+          <a:noFill/>
+          <a:ln w="9525">
+            <a:solidFill>
+              <a:schemeClr val="bg1"/>
+            </a:solidFill>
+          </a:ln>
+        </p:spPr>
+        <p:style>
+          <a:lnRef idx="2">
+            <a:schemeClr val="accent1">
+              <a:shade val="50000"/>
+            </a:schemeClr>
+          </a:lnRef>
+          <a:fillRef idx="1">
+            <a:schemeClr val="accent1"/>
+          </a:fillRef>
+          <a:effectRef idx="0">
+            <a:schemeClr val="accent1"/>
+          </a:effectRef>
+          <a:fontRef idx="minor">
+            <a:schemeClr val="lt1"/>
+          </a:fontRef>
+        </p:style>
+      </p:cxnSp>
+      <p:sp>
+        <p:nvSpPr>
+          <p:cNvPr id="176" name="TextBox 175"/>
+          <p:cNvSpPr txBox="1"/>
+          <p:nvPr/>
+        </p:nvSpPr>
+        <p:spPr>
+          <a:xfrm flipH="1">
+            <a:off x="882749" y="57486"/>
+            <a:ext cx="1152060" cy="187744"/>
+          </a:xfrm>
+          <a:prstGeom prst="rect">
+            <a:avLst/>
+          </a:prstGeom>
+          <a:solidFill>
+            <a:schemeClr val="bg1"/>
+          </a:solidFill>
+        </p:spPr>
+        <p:txBody>
+          <a:bodyPr wrap="square" lIns="0" tIns="0" rIns="0" bIns="18288" rtlCol="0">
+            <a:spAutoFit/>
+          </a:bodyPr>
+          <a:lstStyle/>
+          <a:p>
+            <a:pPr algn="ctr"/>
+            <a:r>
+              <a:rPr lang="en-US" sz="1100" dirty="0" smtClean="0">
                 <a:latin typeface="NimbusRomNo9L" panose="01010103010101010101" pitchFamily="2" charset="0"/>
                 <a:cs typeface="Times New Roman" panose="02020603050405020304" pitchFamily="18" charset="0"/>
               </a:rPr>
               <a:t>steerable needle</a:t>
             </a:r>
-            <a:endParaRPr lang="en-US" sz="900" dirty="0">
+            <a:endParaRPr lang="en-US" sz="1100" dirty="0">
               <a:latin typeface="NimbusRomNo9L" panose="01010103010101010101" pitchFamily="2" charset="0"/>
               <a:cs typeface="Times New Roman" panose="02020603050405020304" pitchFamily="18" charset="0"/>
             </a:endParaRPr>
@@ -7662,12 +7632,12 @@
         </p:nvCxnSpPr>
         <p:spPr>
           <a:xfrm rot="16200000" flipH="1">
-            <a:off x="204657" y="488214"/>
-            <a:ext cx="449244" cy="186860"/>
+            <a:off x="281824" y="565380"/>
+            <a:ext cx="391756" cy="90010"/>
           </a:xfrm>
           <a:prstGeom prst="bentConnector3">
             <a:avLst>
-              <a:gd name="adj1" fmla="val 100532"/>
+              <a:gd name="adj1" fmla="val 100227"/>
             </a:avLst>
           </a:prstGeom>
           <a:noFill/>
@@ -7895,8 +7865,8 @@
         </p:nvSpPr>
         <p:spPr>
           <a:xfrm flipH="1">
-            <a:off x="234677" y="1189332"/>
-            <a:ext cx="649594" cy="156966"/>
+            <a:off x="215844" y="1139043"/>
+            <a:ext cx="649594" cy="187744"/>
           </a:xfrm>
           <a:prstGeom prst="rect">
             <a:avLst/>
@@ -7913,34 +7883,13 @@
           <a:p>
             <a:pPr algn="ctr"/>
             <a:r>
-              <a:rPr lang="en-US" sz="800" i="1" dirty="0">
-                <a:latin typeface="Times New Roman" panose="02020603050405020304" pitchFamily="18" charset="0"/>
-                <a:cs typeface="Times New Roman" panose="02020603050405020304" pitchFamily="18" charset="0"/>
-              </a:rPr>
-              <a:t>ex </a:t>
-            </a:r>
-            <a:r>
-              <a:rPr lang="en-US" sz="800" i="1" dirty="0" smtClean="0">
-                <a:latin typeface="Times New Roman" panose="02020603050405020304" pitchFamily="18" charset="0"/>
-                <a:cs typeface="Times New Roman" panose="02020603050405020304" pitchFamily="18" charset="0"/>
-              </a:rPr>
-              <a:t>vivo</a:t>
-            </a:r>
-            <a:r>
-              <a:rPr lang="en-US" sz="700" i="1" dirty="0" smtClean="0">
-                <a:latin typeface="Times New Roman" panose="02020603050405020304" pitchFamily="18" charset="0"/>
-                <a:cs typeface="Times New Roman" panose="02020603050405020304" pitchFamily="18" charset="0"/>
-              </a:rPr>
-              <a:t> </a:t>
-            </a:r>
-            <a:r>
-              <a:rPr lang="en-US" sz="900" dirty="0" smtClean="0">
+              <a:rPr lang="en-US" sz="1100" dirty="0" smtClean="0">
                 <a:latin typeface="NimbusRomNo9L" panose="01010103010101010101" pitchFamily="2" charset="0"/>
                 <a:cs typeface="Times New Roman" panose="02020603050405020304" pitchFamily="18" charset="0"/>
               </a:rPr>
               <a:t>tissue</a:t>
             </a:r>
-            <a:endParaRPr lang="en-US" sz="900" dirty="0">
+            <a:endParaRPr lang="en-US" sz="1100" dirty="0">
               <a:latin typeface="NimbusRomNo9L" panose="01010103010101010101" pitchFamily="2" charset="0"/>
               <a:cs typeface="Times New Roman" panose="02020603050405020304" pitchFamily="18" charset="0"/>
             </a:endParaRPr>

</xml_diff>